<commit_message>
Notebook with abstract and Neural Network talky bits
</commit_message>
<xml_diff>
--- a/Block Charts.pptx
+++ b/Block Charts.pptx
@@ -12,6 +12,7 @@
     <p:sldId id="260" r:id="rId6"/>
     <p:sldId id="261" r:id="rId7"/>
     <p:sldId id="262" r:id="rId8"/>
+    <p:sldId id="263" r:id="rId9"/>
   </p:sldIdLst>
   <p:sldSz cx="12192000" cy="6858000"/>
   <p:notesSz cx="6858000" cy="9144000"/>
@@ -265,7 +266,7 @@
           <a:p>
             <a:fld id="{5D61F03F-7AA0-4746-9E67-B37A7061CD2D}" type="datetimeFigureOut">
               <a:rPr lang="en-US" smtClean="0"/>
-              <a:t>4/15/2024</a:t>
+              <a:t>4/21/2024</a:t>
             </a:fld>
             <a:endParaRPr lang="en-US"/>
           </a:p>
@@ -463,7 +464,7 @@
           <a:p>
             <a:fld id="{5D61F03F-7AA0-4746-9E67-B37A7061CD2D}" type="datetimeFigureOut">
               <a:rPr lang="en-US" smtClean="0"/>
-              <a:t>4/15/2024</a:t>
+              <a:t>4/21/2024</a:t>
             </a:fld>
             <a:endParaRPr lang="en-US"/>
           </a:p>
@@ -671,7 +672,7 @@
           <a:p>
             <a:fld id="{5D61F03F-7AA0-4746-9E67-B37A7061CD2D}" type="datetimeFigureOut">
               <a:rPr lang="en-US" smtClean="0"/>
-              <a:t>4/15/2024</a:t>
+              <a:t>4/21/2024</a:t>
             </a:fld>
             <a:endParaRPr lang="en-US"/>
           </a:p>
@@ -869,7 +870,7 @@
           <a:p>
             <a:fld id="{5D61F03F-7AA0-4746-9E67-B37A7061CD2D}" type="datetimeFigureOut">
               <a:rPr lang="en-US" smtClean="0"/>
-              <a:t>4/15/2024</a:t>
+              <a:t>4/21/2024</a:t>
             </a:fld>
             <a:endParaRPr lang="en-US"/>
           </a:p>
@@ -1144,7 +1145,7 @@
           <a:p>
             <a:fld id="{5D61F03F-7AA0-4746-9E67-B37A7061CD2D}" type="datetimeFigureOut">
               <a:rPr lang="en-US" smtClean="0"/>
-              <a:t>4/15/2024</a:t>
+              <a:t>4/21/2024</a:t>
             </a:fld>
             <a:endParaRPr lang="en-US"/>
           </a:p>
@@ -1409,7 +1410,7 @@
           <a:p>
             <a:fld id="{5D61F03F-7AA0-4746-9E67-B37A7061CD2D}" type="datetimeFigureOut">
               <a:rPr lang="en-US" smtClean="0"/>
-              <a:t>4/15/2024</a:t>
+              <a:t>4/21/2024</a:t>
             </a:fld>
             <a:endParaRPr lang="en-US"/>
           </a:p>
@@ -1821,7 +1822,7 @@
           <a:p>
             <a:fld id="{5D61F03F-7AA0-4746-9E67-B37A7061CD2D}" type="datetimeFigureOut">
               <a:rPr lang="en-US" smtClean="0"/>
-              <a:t>4/15/2024</a:t>
+              <a:t>4/21/2024</a:t>
             </a:fld>
             <a:endParaRPr lang="en-US"/>
           </a:p>
@@ -1962,7 +1963,7 @@
           <a:p>
             <a:fld id="{5D61F03F-7AA0-4746-9E67-B37A7061CD2D}" type="datetimeFigureOut">
               <a:rPr lang="en-US" smtClean="0"/>
-              <a:t>4/15/2024</a:t>
+              <a:t>4/21/2024</a:t>
             </a:fld>
             <a:endParaRPr lang="en-US"/>
           </a:p>
@@ -2075,7 +2076,7 @@
           <a:p>
             <a:fld id="{5D61F03F-7AA0-4746-9E67-B37A7061CD2D}" type="datetimeFigureOut">
               <a:rPr lang="en-US" smtClean="0"/>
-              <a:t>4/15/2024</a:t>
+              <a:t>4/21/2024</a:t>
             </a:fld>
             <a:endParaRPr lang="en-US"/>
           </a:p>
@@ -2386,7 +2387,7 @@
           <a:p>
             <a:fld id="{5D61F03F-7AA0-4746-9E67-B37A7061CD2D}" type="datetimeFigureOut">
               <a:rPr lang="en-US" smtClean="0"/>
-              <a:t>4/15/2024</a:t>
+              <a:t>4/21/2024</a:t>
             </a:fld>
             <a:endParaRPr lang="en-US"/>
           </a:p>
@@ -2674,7 +2675,7 @@
           <a:p>
             <a:fld id="{5D61F03F-7AA0-4746-9E67-B37A7061CD2D}" type="datetimeFigureOut">
               <a:rPr lang="en-US" smtClean="0"/>
-              <a:t>4/15/2024</a:t>
+              <a:t>4/21/2024</a:t>
             </a:fld>
             <a:endParaRPr lang="en-US"/>
           </a:p>
@@ -2915,7 +2916,7 @@
           <a:p>
             <a:fld id="{5D61F03F-7AA0-4746-9E67-B37A7061CD2D}" type="datetimeFigureOut">
               <a:rPr lang="en-US" smtClean="0"/>
-              <a:t>4/15/2024</a:t>
+              <a:t>4/21/2024</a:t>
             </a:fld>
             <a:endParaRPr lang="en-US"/>
           </a:p>
@@ -7395,6 +7396,1499 @@
     <p:extLst>
       <p:ext uri="{BB962C8B-B14F-4D97-AF65-F5344CB8AC3E}">
         <p14:creationId xmlns:p14="http://schemas.microsoft.com/office/powerpoint/2010/main" val="753349070"/>
+      </p:ext>
+    </p:extLst>
+  </p:cSld>
+  <p:clrMapOvr>
+    <a:masterClrMapping/>
+  </p:clrMapOvr>
+</p:sld>
+</file>
+
+<file path=ppt/slides/slide8.xml><?xml version="1.0" encoding="utf-8"?>
+<p:sld xmlns:a="http://schemas.openxmlformats.org/drawingml/2006/main" xmlns:r="http://schemas.openxmlformats.org/officeDocument/2006/relationships" xmlns:p="http://schemas.openxmlformats.org/presentationml/2006/main">
+  <p:cSld>
+    <p:spTree>
+      <p:nvGrpSpPr>
+        <p:cNvPr id="1" name=""/>
+        <p:cNvGrpSpPr/>
+        <p:nvPr/>
+      </p:nvGrpSpPr>
+      <p:grpSpPr>
+        <a:xfrm>
+          <a:off x="0" y="0"/>
+          <a:ext cx="0" cy="0"/>
+          <a:chOff x="0" y="0"/>
+          <a:chExt cx="0" cy="0"/>
+        </a:xfrm>
+      </p:grpSpPr>
+      <p:sp>
+        <p:nvSpPr>
+          <p:cNvPr id="5" name="Rectangle: Rounded Corners 4">
+            <a:extLst>
+              <a:ext uri="{FF2B5EF4-FFF2-40B4-BE49-F238E27FC236}">
+                <a16:creationId xmlns:a16="http://schemas.microsoft.com/office/drawing/2014/main" id="{4FFF624B-8EA3-1961-D891-BA177DB8C9BD}"/>
+              </a:ext>
+            </a:extLst>
+          </p:cNvPr>
+          <p:cNvSpPr/>
+          <p:nvPr/>
+        </p:nvSpPr>
+        <p:spPr>
+          <a:xfrm>
+            <a:off x="253459" y="293891"/>
+            <a:ext cx="5003747" cy="6270217"/>
+          </a:xfrm>
+          <a:prstGeom prst="roundRect">
+            <a:avLst/>
+          </a:prstGeom>
+          <a:solidFill>
+            <a:schemeClr val="bg2">
+              <a:lumMod val="90000"/>
+            </a:schemeClr>
+          </a:solidFill>
+        </p:spPr>
+        <p:style>
+          <a:lnRef idx="2">
+            <a:schemeClr val="accent1">
+              <a:shade val="15000"/>
+            </a:schemeClr>
+          </a:lnRef>
+          <a:fillRef idx="1">
+            <a:schemeClr val="accent1"/>
+          </a:fillRef>
+          <a:effectRef idx="0">
+            <a:schemeClr val="accent1"/>
+          </a:effectRef>
+          <a:fontRef idx="minor">
+            <a:schemeClr val="lt1"/>
+          </a:fontRef>
+        </p:style>
+        <p:txBody>
+          <a:bodyPr rtlCol="0" anchor="ctr"/>
+          <a:lstStyle/>
+          <a:p>
+            <a:pPr algn="ctr"/>
+            <a:endParaRPr lang="en-US"/>
+          </a:p>
+        </p:txBody>
+      </p:sp>
+      <p:sp>
+        <p:nvSpPr>
+          <p:cNvPr id="6" name="Rectangle 5">
+            <a:extLst>
+              <a:ext uri="{FF2B5EF4-FFF2-40B4-BE49-F238E27FC236}">
+                <a16:creationId xmlns:a16="http://schemas.microsoft.com/office/drawing/2014/main" id="{86CD4DBF-CD63-99C0-CC79-4C9E0E683EF4}"/>
+              </a:ext>
+            </a:extLst>
+          </p:cNvPr>
+          <p:cNvSpPr/>
+          <p:nvPr/>
+        </p:nvSpPr>
+        <p:spPr>
+          <a:xfrm>
+            <a:off x="982517" y="2080546"/>
+            <a:ext cx="1334278" cy="569167"/>
+          </a:xfrm>
+          <a:prstGeom prst="rect">
+            <a:avLst/>
+          </a:prstGeom>
+        </p:spPr>
+        <p:style>
+          <a:lnRef idx="2">
+            <a:schemeClr val="accent1">
+              <a:shade val="15000"/>
+            </a:schemeClr>
+          </a:lnRef>
+          <a:fillRef idx="1">
+            <a:schemeClr val="accent1"/>
+          </a:fillRef>
+          <a:effectRef idx="0">
+            <a:schemeClr val="accent1"/>
+          </a:effectRef>
+          <a:fontRef idx="minor">
+            <a:schemeClr val="lt1"/>
+          </a:fontRef>
+        </p:style>
+        <p:txBody>
+          <a:bodyPr rtlCol="0" anchor="ctr"/>
+          <a:lstStyle/>
+          <a:p>
+            <a:pPr algn="ctr"/>
+            <a:r>
+              <a:rPr lang="en-US" dirty="0"/>
+              <a:t>Imputer: median</a:t>
+            </a:r>
+          </a:p>
+        </p:txBody>
+      </p:sp>
+      <p:cxnSp>
+        <p:nvCxnSpPr>
+          <p:cNvPr id="7" name="Straight Arrow Connector 6">
+            <a:extLst>
+              <a:ext uri="{FF2B5EF4-FFF2-40B4-BE49-F238E27FC236}">
+                <a16:creationId xmlns:a16="http://schemas.microsoft.com/office/drawing/2014/main" id="{BC133880-A04B-927B-24B9-9047D9EAA820}"/>
+              </a:ext>
+            </a:extLst>
+          </p:cNvPr>
+          <p:cNvCxnSpPr>
+            <a:cxnSpLocks/>
+            <a:stCxn id="6" idx="2"/>
+          </p:cNvCxnSpPr>
+          <p:nvPr/>
+        </p:nvCxnSpPr>
+        <p:spPr>
+          <a:xfrm>
+            <a:off x="1649656" y="2649713"/>
+            <a:ext cx="2310" cy="494704"/>
+          </a:xfrm>
+          <a:prstGeom prst="straightConnector1">
+            <a:avLst/>
+          </a:prstGeom>
+          <a:ln>
+            <a:tailEnd type="triangle"/>
+          </a:ln>
+        </p:spPr>
+        <p:style>
+          <a:lnRef idx="2">
+            <a:schemeClr val="accent1"/>
+          </a:lnRef>
+          <a:fillRef idx="0">
+            <a:schemeClr val="accent1"/>
+          </a:fillRef>
+          <a:effectRef idx="1">
+            <a:schemeClr val="accent1"/>
+          </a:effectRef>
+          <a:fontRef idx="minor">
+            <a:schemeClr val="tx1"/>
+          </a:fontRef>
+        </p:style>
+      </p:cxnSp>
+      <p:sp>
+        <p:nvSpPr>
+          <p:cNvPr id="8" name="Rectangle 7">
+            <a:extLst>
+              <a:ext uri="{FF2B5EF4-FFF2-40B4-BE49-F238E27FC236}">
+                <a16:creationId xmlns:a16="http://schemas.microsoft.com/office/drawing/2014/main" id="{FF9E0FD4-E509-7A06-1C0D-56E6259C544F}"/>
+              </a:ext>
+            </a:extLst>
+          </p:cNvPr>
+          <p:cNvSpPr/>
+          <p:nvPr/>
+        </p:nvSpPr>
+        <p:spPr>
+          <a:xfrm>
+            <a:off x="982516" y="3156958"/>
+            <a:ext cx="1334278" cy="569167"/>
+          </a:xfrm>
+          <a:prstGeom prst="rect">
+            <a:avLst/>
+          </a:prstGeom>
+        </p:spPr>
+        <p:style>
+          <a:lnRef idx="2">
+            <a:schemeClr val="accent1">
+              <a:shade val="15000"/>
+            </a:schemeClr>
+          </a:lnRef>
+          <a:fillRef idx="1">
+            <a:schemeClr val="accent1"/>
+          </a:fillRef>
+          <a:effectRef idx="0">
+            <a:schemeClr val="accent1"/>
+          </a:effectRef>
+          <a:fontRef idx="minor">
+            <a:schemeClr val="lt1"/>
+          </a:fontRef>
+        </p:style>
+        <p:txBody>
+          <a:bodyPr rtlCol="0" anchor="ctr"/>
+          <a:lstStyle/>
+          <a:p>
+            <a:pPr algn="ctr"/>
+            <a:r>
+              <a:rPr lang="en-US" dirty="0"/>
+              <a:t>Standard Scaler</a:t>
+            </a:r>
+          </a:p>
+        </p:txBody>
+      </p:sp>
+      <p:cxnSp>
+        <p:nvCxnSpPr>
+          <p:cNvPr id="9" name="Straight Arrow Connector 8">
+            <a:extLst>
+              <a:ext uri="{FF2B5EF4-FFF2-40B4-BE49-F238E27FC236}">
+                <a16:creationId xmlns:a16="http://schemas.microsoft.com/office/drawing/2014/main" id="{DF28ADB4-5683-C577-5885-03788F09291D}"/>
+              </a:ext>
+            </a:extLst>
+          </p:cNvPr>
+          <p:cNvCxnSpPr>
+            <a:cxnSpLocks/>
+            <a:stCxn id="8" idx="2"/>
+            <a:endCxn id="14" idx="0"/>
+          </p:cNvCxnSpPr>
+          <p:nvPr/>
+        </p:nvCxnSpPr>
+        <p:spPr>
+          <a:xfrm>
+            <a:off x="1649655" y="3726125"/>
+            <a:ext cx="1334278" cy="458674"/>
+          </a:xfrm>
+          <a:prstGeom prst="straightConnector1">
+            <a:avLst/>
+          </a:prstGeom>
+          <a:ln>
+            <a:tailEnd type="triangle"/>
+          </a:ln>
+        </p:spPr>
+        <p:style>
+          <a:lnRef idx="2">
+            <a:schemeClr val="accent1"/>
+          </a:lnRef>
+          <a:fillRef idx="0">
+            <a:schemeClr val="accent1"/>
+          </a:fillRef>
+          <a:effectRef idx="1">
+            <a:schemeClr val="accent1"/>
+          </a:effectRef>
+          <a:fontRef idx="minor">
+            <a:schemeClr val="tx1"/>
+          </a:fontRef>
+        </p:style>
+      </p:cxnSp>
+      <p:sp>
+        <p:nvSpPr>
+          <p:cNvPr id="10" name="Rectangle 9">
+            <a:extLst>
+              <a:ext uri="{FF2B5EF4-FFF2-40B4-BE49-F238E27FC236}">
+                <a16:creationId xmlns:a16="http://schemas.microsoft.com/office/drawing/2014/main" id="{40673218-340B-1075-3FF0-64F280A9B565}"/>
+              </a:ext>
+            </a:extLst>
+          </p:cNvPr>
+          <p:cNvSpPr/>
+          <p:nvPr/>
+        </p:nvSpPr>
+        <p:spPr>
+          <a:xfrm>
+            <a:off x="3432948" y="2080546"/>
+            <a:ext cx="1334278" cy="569167"/>
+          </a:xfrm>
+          <a:prstGeom prst="rect">
+            <a:avLst/>
+          </a:prstGeom>
+        </p:spPr>
+        <p:style>
+          <a:lnRef idx="2">
+            <a:schemeClr val="accent1">
+              <a:shade val="15000"/>
+            </a:schemeClr>
+          </a:lnRef>
+          <a:fillRef idx="1">
+            <a:schemeClr val="accent1"/>
+          </a:fillRef>
+          <a:effectRef idx="0">
+            <a:schemeClr val="accent1"/>
+          </a:effectRef>
+          <a:fontRef idx="minor">
+            <a:schemeClr val="lt1"/>
+          </a:fontRef>
+        </p:style>
+        <p:txBody>
+          <a:bodyPr rtlCol="0" anchor="ctr"/>
+          <a:lstStyle/>
+          <a:p>
+            <a:pPr algn="ctr"/>
+            <a:r>
+              <a:rPr lang="en-US" dirty="0"/>
+              <a:t>Imputer: “missing”</a:t>
+            </a:r>
+          </a:p>
+        </p:txBody>
+      </p:sp>
+      <p:cxnSp>
+        <p:nvCxnSpPr>
+          <p:cNvPr id="11" name="Straight Arrow Connector 10">
+            <a:extLst>
+              <a:ext uri="{FF2B5EF4-FFF2-40B4-BE49-F238E27FC236}">
+                <a16:creationId xmlns:a16="http://schemas.microsoft.com/office/drawing/2014/main" id="{F2088BEE-02D8-7746-5FF2-627A0B671492}"/>
+              </a:ext>
+            </a:extLst>
+          </p:cNvPr>
+          <p:cNvCxnSpPr>
+            <a:cxnSpLocks/>
+            <a:stCxn id="10" idx="2"/>
+          </p:cNvCxnSpPr>
+          <p:nvPr/>
+        </p:nvCxnSpPr>
+        <p:spPr>
+          <a:xfrm>
+            <a:off x="4100087" y="2649713"/>
+            <a:ext cx="2310" cy="494704"/>
+          </a:xfrm>
+          <a:prstGeom prst="straightConnector1">
+            <a:avLst/>
+          </a:prstGeom>
+          <a:ln>
+            <a:tailEnd type="triangle"/>
+          </a:ln>
+        </p:spPr>
+        <p:style>
+          <a:lnRef idx="2">
+            <a:schemeClr val="accent1"/>
+          </a:lnRef>
+          <a:fillRef idx="0">
+            <a:schemeClr val="accent1"/>
+          </a:fillRef>
+          <a:effectRef idx="1">
+            <a:schemeClr val="accent1"/>
+          </a:effectRef>
+          <a:fontRef idx="minor">
+            <a:schemeClr val="tx1"/>
+          </a:fontRef>
+        </p:style>
+      </p:cxnSp>
+      <p:sp>
+        <p:nvSpPr>
+          <p:cNvPr id="12" name="Rectangle 11">
+            <a:extLst>
+              <a:ext uri="{FF2B5EF4-FFF2-40B4-BE49-F238E27FC236}">
+                <a16:creationId xmlns:a16="http://schemas.microsoft.com/office/drawing/2014/main" id="{8CDC9103-C65E-401F-0AD1-DE81D4BABEDD}"/>
+              </a:ext>
+            </a:extLst>
+          </p:cNvPr>
+          <p:cNvSpPr/>
+          <p:nvPr/>
+        </p:nvSpPr>
+        <p:spPr>
+          <a:xfrm>
+            <a:off x="3432948" y="3144417"/>
+            <a:ext cx="1334278" cy="569167"/>
+          </a:xfrm>
+          <a:prstGeom prst="rect">
+            <a:avLst/>
+          </a:prstGeom>
+        </p:spPr>
+        <p:style>
+          <a:lnRef idx="2">
+            <a:schemeClr val="accent1">
+              <a:shade val="15000"/>
+            </a:schemeClr>
+          </a:lnRef>
+          <a:fillRef idx="1">
+            <a:schemeClr val="accent1"/>
+          </a:fillRef>
+          <a:effectRef idx="0">
+            <a:schemeClr val="accent1"/>
+          </a:effectRef>
+          <a:fontRef idx="minor">
+            <a:schemeClr val="lt1"/>
+          </a:fontRef>
+        </p:style>
+        <p:txBody>
+          <a:bodyPr rtlCol="0" anchor="ctr"/>
+          <a:lstStyle/>
+          <a:p>
+            <a:pPr algn="ctr"/>
+            <a:r>
+              <a:rPr lang="en-US" dirty="0"/>
+              <a:t>Standard Scaler</a:t>
+            </a:r>
+          </a:p>
+        </p:txBody>
+      </p:sp>
+      <p:cxnSp>
+        <p:nvCxnSpPr>
+          <p:cNvPr id="13" name="Straight Arrow Connector 12">
+            <a:extLst>
+              <a:ext uri="{FF2B5EF4-FFF2-40B4-BE49-F238E27FC236}">
+                <a16:creationId xmlns:a16="http://schemas.microsoft.com/office/drawing/2014/main" id="{88544B3E-D1AB-A504-BF32-41BD84E4CF91}"/>
+              </a:ext>
+            </a:extLst>
+          </p:cNvPr>
+          <p:cNvCxnSpPr>
+            <a:cxnSpLocks/>
+            <a:stCxn id="12" idx="2"/>
+            <a:endCxn id="14" idx="0"/>
+          </p:cNvCxnSpPr>
+          <p:nvPr/>
+        </p:nvCxnSpPr>
+        <p:spPr>
+          <a:xfrm flipH="1">
+            <a:off x="2983933" y="3713584"/>
+            <a:ext cx="1116154" cy="471215"/>
+          </a:xfrm>
+          <a:prstGeom prst="straightConnector1">
+            <a:avLst/>
+          </a:prstGeom>
+          <a:ln>
+            <a:tailEnd type="triangle"/>
+          </a:ln>
+        </p:spPr>
+        <p:style>
+          <a:lnRef idx="2">
+            <a:schemeClr val="accent1"/>
+          </a:lnRef>
+          <a:fillRef idx="0">
+            <a:schemeClr val="accent1"/>
+          </a:fillRef>
+          <a:effectRef idx="1">
+            <a:schemeClr val="accent1"/>
+          </a:effectRef>
+          <a:fontRef idx="minor">
+            <a:schemeClr val="tx1"/>
+          </a:fontRef>
+        </p:style>
+      </p:cxnSp>
+      <p:sp>
+        <p:nvSpPr>
+          <p:cNvPr id="14" name="Rectangle 13">
+            <a:extLst>
+              <a:ext uri="{FF2B5EF4-FFF2-40B4-BE49-F238E27FC236}">
+                <a16:creationId xmlns:a16="http://schemas.microsoft.com/office/drawing/2014/main" id="{513F6B09-4A7C-BF5C-455D-22FEE33E8C79}"/>
+              </a:ext>
+            </a:extLst>
+          </p:cNvPr>
+          <p:cNvSpPr/>
+          <p:nvPr/>
+        </p:nvSpPr>
+        <p:spPr>
+          <a:xfrm>
+            <a:off x="2316794" y="4184799"/>
+            <a:ext cx="1334278" cy="569167"/>
+          </a:xfrm>
+          <a:prstGeom prst="rect">
+            <a:avLst/>
+          </a:prstGeom>
+        </p:spPr>
+        <p:style>
+          <a:lnRef idx="2">
+            <a:schemeClr val="accent1">
+              <a:shade val="15000"/>
+            </a:schemeClr>
+          </a:lnRef>
+          <a:fillRef idx="1">
+            <a:schemeClr val="accent1"/>
+          </a:fillRef>
+          <a:effectRef idx="0">
+            <a:schemeClr val="accent1"/>
+          </a:effectRef>
+          <a:fontRef idx="minor">
+            <a:schemeClr val="lt1"/>
+          </a:fontRef>
+        </p:style>
+        <p:txBody>
+          <a:bodyPr rtlCol="0" anchor="ctr"/>
+          <a:lstStyle/>
+          <a:p>
+            <a:pPr algn="ctr"/>
+            <a:r>
+              <a:rPr lang="en-US" dirty="0"/>
+              <a:t>Column Transformer</a:t>
+            </a:r>
+          </a:p>
+        </p:txBody>
+      </p:sp>
+      <p:sp>
+        <p:nvSpPr>
+          <p:cNvPr id="15" name="Rectangle 14">
+            <a:extLst>
+              <a:ext uri="{FF2B5EF4-FFF2-40B4-BE49-F238E27FC236}">
+                <a16:creationId xmlns:a16="http://schemas.microsoft.com/office/drawing/2014/main" id="{31073C7A-0FB0-CDC5-4BDB-989168C47CA2}"/>
+              </a:ext>
+            </a:extLst>
+          </p:cNvPr>
+          <p:cNvSpPr/>
+          <p:nvPr/>
+        </p:nvSpPr>
+        <p:spPr>
+          <a:xfrm>
+            <a:off x="1926806" y="5261211"/>
+            <a:ext cx="2114252" cy="569167"/>
+          </a:xfrm>
+          <a:prstGeom prst="rect">
+            <a:avLst/>
+          </a:prstGeom>
+        </p:spPr>
+        <p:style>
+          <a:lnRef idx="2">
+            <a:schemeClr val="accent1">
+              <a:shade val="15000"/>
+            </a:schemeClr>
+          </a:lnRef>
+          <a:fillRef idx="1">
+            <a:schemeClr val="accent1"/>
+          </a:fillRef>
+          <a:effectRef idx="0">
+            <a:schemeClr val="accent1"/>
+          </a:effectRef>
+          <a:fontRef idx="minor">
+            <a:schemeClr val="lt1"/>
+          </a:fontRef>
+        </p:style>
+        <p:txBody>
+          <a:bodyPr rtlCol="0" anchor="ctr"/>
+          <a:lstStyle/>
+          <a:p>
+            <a:pPr algn="ctr"/>
+            <a:r>
+              <a:rPr lang="en-US" dirty="0"/>
+              <a:t>Neural Network</a:t>
+            </a:r>
+          </a:p>
+        </p:txBody>
+      </p:sp>
+      <p:cxnSp>
+        <p:nvCxnSpPr>
+          <p:cNvPr id="16" name="Straight Arrow Connector 15">
+            <a:extLst>
+              <a:ext uri="{FF2B5EF4-FFF2-40B4-BE49-F238E27FC236}">
+                <a16:creationId xmlns:a16="http://schemas.microsoft.com/office/drawing/2014/main" id="{689F70BF-7D81-6A61-4B18-8FB58A8C6A58}"/>
+              </a:ext>
+            </a:extLst>
+          </p:cNvPr>
+          <p:cNvCxnSpPr>
+            <a:cxnSpLocks/>
+          </p:cNvCxnSpPr>
+          <p:nvPr/>
+        </p:nvCxnSpPr>
+        <p:spPr>
+          <a:xfrm>
+            <a:off x="2983933" y="4766507"/>
+            <a:ext cx="2310" cy="494704"/>
+          </a:xfrm>
+          <a:prstGeom prst="straightConnector1">
+            <a:avLst/>
+          </a:prstGeom>
+          <a:ln>
+            <a:tailEnd type="triangle"/>
+          </a:ln>
+        </p:spPr>
+        <p:style>
+          <a:lnRef idx="2">
+            <a:schemeClr val="accent1"/>
+          </a:lnRef>
+          <a:fillRef idx="0">
+            <a:schemeClr val="accent1"/>
+          </a:fillRef>
+          <a:effectRef idx="1">
+            <a:schemeClr val="accent1"/>
+          </a:effectRef>
+          <a:fontRef idx="minor">
+            <a:schemeClr val="tx1"/>
+          </a:fontRef>
+        </p:style>
+      </p:cxnSp>
+      <p:sp>
+        <p:nvSpPr>
+          <p:cNvPr id="17" name="TextBox 16">
+            <a:extLst>
+              <a:ext uri="{FF2B5EF4-FFF2-40B4-BE49-F238E27FC236}">
+                <a16:creationId xmlns:a16="http://schemas.microsoft.com/office/drawing/2014/main" id="{3BECDBE8-2BEE-7B50-8B2B-39B5850B6FC4}"/>
+              </a:ext>
+            </a:extLst>
+          </p:cNvPr>
+          <p:cNvSpPr txBox="1"/>
+          <p:nvPr/>
+        </p:nvSpPr>
+        <p:spPr>
+          <a:xfrm>
+            <a:off x="1495331" y="354159"/>
+            <a:ext cx="2977203" cy="369332"/>
+          </a:xfrm>
+          <a:prstGeom prst="rect">
+            <a:avLst/>
+          </a:prstGeom>
+          <a:noFill/>
+        </p:spPr>
+        <p:txBody>
+          <a:bodyPr wrap="square" rtlCol="0">
+            <a:spAutoFit/>
+          </a:bodyPr>
+          <a:lstStyle/>
+          <a:p>
+            <a:r>
+              <a:rPr lang="en-US" b="1" dirty="0"/>
+              <a:t>Neural Network Pipeline</a:t>
+            </a:r>
+          </a:p>
+        </p:txBody>
+      </p:sp>
+      <p:sp>
+        <p:nvSpPr>
+          <p:cNvPr id="31" name="Rectangle 30">
+            <a:extLst>
+              <a:ext uri="{FF2B5EF4-FFF2-40B4-BE49-F238E27FC236}">
+                <a16:creationId xmlns:a16="http://schemas.microsoft.com/office/drawing/2014/main" id="{D7D5A602-9C2B-F6D4-1E88-7C6FA4E2B931}"/>
+              </a:ext>
+            </a:extLst>
+          </p:cNvPr>
+          <p:cNvSpPr/>
+          <p:nvPr/>
+        </p:nvSpPr>
+        <p:spPr>
+          <a:xfrm>
+            <a:off x="589485" y="1039072"/>
+            <a:ext cx="2120341" cy="569167"/>
+          </a:xfrm>
+          <a:prstGeom prst="rect">
+            <a:avLst/>
+          </a:prstGeom>
+        </p:spPr>
+        <p:style>
+          <a:lnRef idx="2">
+            <a:schemeClr val="accent1">
+              <a:shade val="15000"/>
+            </a:schemeClr>
+          </a:lnRef>
+          <a:fillRef idx="1">
+            <a:schemeClr val="accent1"/>
+          </a:fillRef>
+          <a:effectRef idx="0">
+            <a:schemeClr val="accent1"/>
+          </a:effectRef>
+          <a:fontRef idx="minor">
+            <a:schemeClr val="lt1"/>
+          </a:fontRef>
+        </p:style>
+        <p:txBody>
+          <a:bodyPr rtlCol="0" anchor="ctr"/>
+          <a:lstStyle/>
+          <a:p>
+            <a:pPr algn="ctr"/>
+            <a:r>
+              <a:rPr lang="en-US" dirty="0"/>
+              <a:t>Replace_values</a:t>
+            </a:r>
+          </a:p>
+        </p:txBody>
+      </p:sp>
+      <p:cxnSp>
+        <p:nvCxnSpPr>
+          <p:cNvPr id="32" name="Straight Arrow Connector 31">
+            <a:extLst>
+              <a:ext uri="{FF2B5EF4-FFF2-40B4-BE49-F238E27FC236}">
+                <a16:creationId xmlns:a16="http://schemas.microsoft.com/office/drawing/2014/main" id="{3606BA42-83CA-0E12-6BB4-E4D66BE3666C}"/>
+              </a:ext>
+            </a:extLst>
+          </p:cNvPr>
+          <p:cNvCxnSpPr>
+            <a:cxnSpLocks/>
+            <a:stCxn id="31" idx="2"/>
+            <a:endCxn id="6" idx="0"/>
+          </p:cNvCxnSpPr>
+          <p:nvPr/>
+        </p:nvCxnSpPr>
+        <p:spPr>
+          <a:xfrm>
+            <a:off x="1649656" y="1608239"/>
+            <a:ext cx="0" cy="472307"/>
+          </a:xfrm>
+          <a:prstGeom prst="straightConnector1">
+            <a:avLst/>
+          </a:prstGeom>
+          <a:ln>
+            <a:tailEnd type="triangle"/>
+          </a:ln>
+        </p:spPr>
+        <p:style>
+          <a:lnRef idx="2">
+            <a:schemeClr val="accent1"/>
+          </a:lnRef>
+          <a:fillRef idx="0">
+            <a:schemeClr val="accent1"/>
+          </a:fillRef>
+          <a:effectRef idx="1">
+            <a:schemeClr val="accent1"/>
+          </a:effectRef>
+          <a:fontRef idx="minor">
+            <a:schemeClr val="tx1"/>
+          </a:fontRef>
+        </p:style>
+      </p:cxnSp>
+      <p:sp>
+        <p:nvSpPr>
+          <p:cNvPr id="2" name="Rectangle: Rounded Corners 1">
+            <a:extLst>
+              <a:ext uri="{FF2B5EF4-FFF2-40B4-BE49-F238E27FC236}">
+                <a16:creationId xmlns:a16="http://schemas.microsoft.com/office/drawing/2014/main" id="{470751C7-0CEA-1D74-3C6A-3C9BE34AD621}"/>
+              </a:ext>
+            </a:extLst>
+          </p:cNvPr>
+          <p:cNvSpPr/>
+          <p:nvPr/>
+        </p:nvSpPr>
+        <p:spPr>
+          <a:xfrm>
+            <a:off x="5538597" y="293891"/>
+            <a:ext cx="5003747" cy="6270217"/>
+          </a:xfrm>
+          <a:prstGeom prst="roundRect">
+            <a:avLst/>
+          </a:prstGeom>
+          <a:solidFill>
+            <a:schemeClr val="bg2">
+              <a:lumMod val="90000"/>
+            </a:schemeClr>
+          </a:solidFill>
+        </p:spPr>
+        <p:style>
+          <a:lnRef idx="2">
+            <a:schemeClr val="accent1">
+              <a:shade val="15000"/>
+            </a:schemeClr>
+          </a:lnRef>
+          <a:fillRef idx="1">
+            <a:schemeClr val="accent1"/>
+          </a:fillRef>
+          <a:effectRef idx="0">
+            <a:schemeClr val="accent1"/>
+          </a:effectRef>
+          <a:fontRef idx="minor">
+            <a:schemeClr val="lt1"/>
+          </a:fontRef>
+        </p:style>
+        <p:txBody>
+          <a:bodyPr rtlCol="0" anchor="ctr"/>
+          <a:lstStyle/>
+          <a:p>
+            <a:pPr algn="ctr"/>
+            <a:endParaRPr lang="en-US"/>
+          </a:p>
+        </p:txBody>
+      </p:sp>
+      <p:sp>
+        <p:nvSpPr>
+          <p:cNvPr id="3" name="Rectangle 2">
+            <a:extLst>
+              <a:ext uri="{FF2B5EF4-FFF2-40B4-BE49-F238E27FC236}">
+                <a16:creationId xmlns:a16="http://schemas.microsoft.com/office/drawing/2014/main" id="{06C35D13-7B5C-9575-ADBD-AB0136BDF093}"/>
+              </a:ext>
+            </a:extLst>
+          </p:cNvPr>
+          <p:cNvSpPr/>
+          <p:nvPr/>
+        </p:nvSpPr>
+        <p:spPr>
+          <a:xfrm>
+            <a:off x="7176815" y="955340"/>
+            <a:ext cx="1727309" cy="569167"/>
+          </a:xfrm>
+          <a:prstGeom prst="rect">
+            <a:avLst/>
+          </a:prstGeom>
+        </p:spPr>
+        <p:style>
+          <a:lnRef idx="2">
+            <a:schemeClr val="accent1">
+              <a:shade val="15000"/>
+            </a:schemeClr>
+          </a:lnRef>
+          <a:fillRef idx="1">
+            <a:schemeClr val="accent1"/>
+          </a:fillRef>
+          <a:effectRef idx="0">
+            <a:schemeClr val="accent1"/>
+          </a:effectRef>
+          <a:fontRef idx="minor">
+            <a:schemeClr val="lt1"/>
+          </a:fontRef>
+        </p:style>
+        <p:txBody>
+          <a:bodyPr rtlCol="0" anchor="ctr"/>
+          <a:lstStyle/>
+          <a:p>
+            <a:pPr algn="ctr"/>
+            <a:r>
+              <a:rPr lang="en-US" dirty="0"/>
+              <a:t>Iterate Training Batches</a:t>
+            </a:r>
+          </a:p>
+        </p:txBody>
+      </p:sp>
+      <p:sp>
+        <p:nvSpPr>
+          <p:cNvPr id="18" name="Rectangle 17">
+            <a:extLst>
+              <a:ext uri="{FF2B5EF4-FFF2-40B4-BE49-F238E27FC236}">
+                <a16:creationId xmlns:a16="http://schemas.microsoft.com/office/drawing/2014/main" id="{85741158-A8DA-789E-FCF0-95AD95EA8DB3}"/>
+              </a:ext>
+            </a:extLst>
+          </p:cNvPr>
+          <p:cNvSpPr/>
+          <p:nvPr/>
+        </p:nvSpPr>
+        <p:spPr>
+          <a:xfrm>
+            <a:off x="7059496" y="1919399"/>
+            <a:ext cx="1961946" cy="569167"/>
+          </a:xfrm>
+          <a:prstGeom prst="rect">
+            <a:avLst/>
+          </a:prstGeom>
+        </p:spPr>
+        <p:style>
+          <a:lnRef idx="2">
+            <a:schemeClr val="accent1">
+              <a:shade val="15000"/>
+            </a:schemeClr>
+          </a:lnRef>
+          <a:fillRef idx="1">
+            <a:schemeClr val="accent1"/>
+          </a:fillRef>
+          <a:effectRef idx="0">
+            <a:schemeClr val="accent1"/>
+          </a:effectRef>
+          <a:fontRef idx="minor">
+            <a:schemeClr val="lt1"/>
+          </a:fontRef>
+        </p:style>
+        <p:txBody>
+          <a:bodyPr rtlCol="0" anchor="ctr"/>
+          <a:lstStyle/>
+          <a:p>
+            <a:pPr algn="ctr"/>
+            <a:r>
+              <a:rPr lang="en-US" dirty="0"/>
+              <a:t>Forward Pass, Loss Backpropagation</a:t>
+            </a:r>
+          </a:p>
+        </p:txBody>
+      </p:sp>
+      <p:sp>
+        <p:nvSpPr>
+          <p:cNvPr id="24" name="Rectangle 23">
+            <a:extLst>
+              <a:ext uri="{FF2B5EF4-FFF2-40B4-BE49-F238E27FC236}">
+                <a16:creationId xmlns:a16="http://schemas.microsoft.com/office/drawing/2014/main" id="{36916781-BD53-D307-ADE2-B7F1D16F932F}"/>
+              </a:ext>
+            </a:extLst>
+          </p:cNvPr>
+          <p:cNvSpPr/>
+          <p:nvPr/>
+        </p:nvSpPr>
+        <p:spPr>
+          <a:xfrm>
+            <a:off x="7059496" y="2880042"/>
+            <a:ext cx="1961946" cy="569167"/>
+          </a:xfrm>
+          <a:prstGeom prst="rect">
+            <a:avLst/>
+          </a:prstGeom>
+        </p:spPr>
+        <p:style>
+          <a:lnRef idx="2">
+            <a:schemeClr val="accent1">
+              <a:shade val="15000"/>
+            </a:schemeClr>
+          </a:lnRef>
+          <a:fillRef idx="1">
+            <a:schemeClr val="accent1"/>
+          </a:fillRef>
+          <a:effectRef idx="0">
+            <a:schemeClr val="accent1"/>
+          </a:effectRef>
+          <a:fontRef idx="minor">
+            <a:schemeClr val="lt1"/>
+          </a:fontRef>
+        </p:style>
+        <p:txBody>
+          <a:bodyPr rtlCol="0" anchor="ctr"/>
+          <a:lstStyle/>
+          <a:p>
+            <a:pPr algn="ctr"/>
+            <a:r>
+              <a:rPr lang="en-US" dirty="0"/>
+              <a:t>Update Model Weights</a:t>
+            </a:r>
+          </a:p>
+        </p:txBody>
+      </p:sp>
+      <p:sp>
+        <p:nvSpPr>
+          <p:cNvPr id="25" name="Rectangle 24">
+            <a:extLst>
+              <a:ext uri="{FF2B5EF4-FFF2-40B4-BE49-F238E27FC236}">
+                <a16:creationId xmlns:a16="http://schemas.microsoft.com/office/drawing/2014/main" id="{F7B4D5D2-5818-99A4-AD33-CA8599424F08}"/>
+              </a:ext>
+            </a:extLst>
+          </p:cNvPr>
+          <p:cNvSpPr/>
+          <p:nvPr/>
+        </p:nvSpPr>
+        <p:spPr>
+          <a:xfrm>
+            <a:off x="6983343" y="3858711"/>
+            <a:ext cx="2114252" cy="569167"/>
+          </a:xfrm>
+          <a:prstGeom prst="rect">
+            <a:avLst/>
+          </a:prstGeom>
+        </p:spPr>
+        <p:style>
+          <a:lnRef idx="2">
+            <a:schemeClr val="accent1">
+              <a:shade val="15000"/>
+            </a:schemeClr>
+          </a:lnRef>
+          <a:fillRef idx="1">
+            <a:schemeClr val="accent1"/>
+          </a:fillRef>
+          <a:effectRef idx="0">
+            <a:schemeClr val="accent1"/>
+          </a:effectRef>
+          <a:fontRef idx="minor">
+            <a:schemeClr val="lt1"/>
+          </a:fontRef>
+        </p:style>
+        <p:txBody>
+          <a:bodyPr rtlCol="0" anchor="ctr"/>
+          <a:lstStyle/>
+          <a:p>
+            <a:pPr algn="ctr"/>
+            <a:r>
+              <a:rPr lang="en-US" dirty="0"/>
+              <a:t>Validation set</a:t>
+            </a:r>
+          </a:p>
+        </p:txBody>
+      </p:sp>
+      <p:sp>
+        <p:nvSpPr>
+          <p:cNvPr id="27" name="TextBox 26">
+            <a:extLst>
+              <a:ext uri="{FF2B5EF4-FFF2-40B4-BE49-F238E27FC236}">
+                <a16:creationId xmlns:a16="http://schemas.microsoft.com/office/drawing/2014/main" id="{FE00A9A3-0261-3809-833F-92BA22A04379}"/>
+              </a:ext>
+            </a:extLst>
+          </p:cNvPr>
+          <p:cNvSpPr txBox="1"/>
+          <p:nvPr/>
+        </p:nvSpPr>
+        <p:spPr>
+          <a:xfrm>
+            <a:off x="6756145" y="367989"/>
+            <a:ext cx="2638333" cy="369332"/>
+          </a:xfrm>
+          <a:prstGeom prst="rect">
+            <a:avLst/>
+          </a:prstGeom>
+          <a:noFill/>
+        </p:spPr>
+        <p:txBody>
+          <a:bodyPr wrap="square" rtlCol="0">
+            <a:spAutoFit/>
+          </a:bodyPr>
+          <a:lstStyle/>
+          <a:p>
+            <a:r>
+              <a:rPr lang="en-US" b="1" dirty="0"/>
+              <a:t>Neural Network Training</a:t>
+            </a:r>
+          </a:p>
+        </p:txBody>
+      </p:sp>
+      <p:sp>
+        <p:nvSpPr>
+          <p:cNvPr id="36" name="Rectangle: Rounded Corners 35">
+            <a:extLst>
+              <a:ext uri="{FF2B5EF4-FFF2-40B4-BE49-F238E27FC236}">
+                <a16:creationId xmlns:a16="http://schemas.microsoft.com/office/drawing/2014/main" id="{F4072AA8-AA3F-924C-9C74-C357C93C2907}"/>
+              </a:ext>
+            </a:extLst>
+          </p:cNvPr>
+          <p:cNvSpPr/>
+          <p:nvPr/>
+        </p:nvSpPr>
+        <p:spPr>
+          <a:xfrm>
+            <a:off x="7059496" y="4804743"/>
+            <a:ext cx="1959818" cy="569167"/>
+          </a:xfrm>
+          <a:prstGeom prst="roundRect">
+            <a:avLst/>
+          </a:prstGeom>
+        </p:spPr>
+        <p:style>
+          <a:lnRef idx="2">
+            <a:schemeClr val="accent1">
+              <a:shade val="15000"/>
+            </a:schemeClr>
+          </a:lnRef>
+          <a:fillRef idx="1">
+            <a:schemeClr val="accent1"/>
+          </a:fillRef>
+          <a:effectRef idx="0">
+            <a:schemeClr val="accent1"/>
+          </a:effectRef>
+          <a:fontRef idx="minor">
+            <a:schemeClr val="lt1"/>
+          </a:fontRef>
+        </p:style>
+        <p:txBody>
+          <a:bodyPr rtlCol="0" anchor="ctr"/>
+          <a:lstStyle/>
+          <a:p>
+            <a:pPr algn="ctr"/>
+            <a:r>
+              <a:rPr lang="en-US" dirty="0"/>
+              <a:t>Improvement?</a:t>
+            </a:r>
+          </a:p>
+        </p:txBody>
+      </p:sp>
+      <p:cxnSp>
+        <p:nvCxnSpPr>
+          <p:cNvPr id="37" name="Straight Arrow Connector 36">
+            <a:extLst>
+              <a:ext uri="{FF2B5EF4-FFF2-40B4-BE49-F238E27FC236}">
+                <a16:creationId xmlns:a16="http://schemas.microsoft.com/office/drawing/2014/main" id="{55BBB827-47FA-674D-3DF4-FE95A4F6F174}"/>
+              </a:ext>
+            </a:extLst>
+          </p:cNvPr>
+          <p:cNvCxnSpPr>
+            <a:cxnSpLocks/>
+            <a:stCxn id="3" idx="2"/>
+          </p:cNvCxnSpPr>
+          <p:nvPr/>
+        </p:nvCxnSpPr>
+        <p:spPr>
+          <a:xfrm>
+            <a:off x="8040470" y="1524507"/>
+            <a:ext cx="0" cy="391476"/>
+          </a:xfrm>
+          <a:prstGeom prst="straightConnector1">
+            <a:avLst/>
+          </a:prstGeom>
+          <a:ln>
+            <a:tailEnd type="triangle"/>
+          </a:ln>
+        </p:spPr>
+        <p:style>
+          <a:lnRef idx="2">
+            <a:schemeClr val="accent1"/>
+          </a:lnRef>
+          <a:fillRef idx="0">
+            <a:schemeClr val="accent1"/>
+          </a:fillRef>
+          <a:effectRef idx="1">
+            <a:schemeClr val="accent1"/>
+          </a:effectRef>
+          <a:fontRef idx="minor">
+            <a:schemeClr val="tx1"/>
+          </a:fontRef>
+        </p:style>
+      </p:cxnSp>
+      <p:cxnSp>
+        <p:nvCxnSpPr>
+          <p:cNvPr id="40" name="Straight Arrow Connector 39">
+            <a:extLst>
+              <a:ext uri="{FF2B5EF4-FFF2-40B4-BE49-F238E27FC236}">
+                <a16:creationId xmlns:a16="http://schemas.microsoft.com/office/drawing/2014/main" id="{AC0B6D42-DF11-4349-A82B-960C39D4EE88}"/>
+              </a:ext>
+            </a:extLst>
+          </p:cNvPr>
+          <p:cNvCxnSpPr>
+            <a:cxnSpLocks/>
+          </p:cNvCxnSpPr>
+          <p:nvPr/>
+        </p:nvCxnSpPr>
+        <p:spPr>
+          <a:xfrm>
+            <a:off x="8040469" y="2488566"/>
+            <a:ext cx="0" cy="391476"/>
+          </a:xfrm>
+          <a:prstGeom prst="straightConnector1">
+            <a:avLst/>
+          </a:prstGeom>
+          <a:ln>
+            <a:tailEnd type="triangle"/>
+          </a:ln>
+        </p:spPr>
+        <p:style>
+          <a:lnRef idx="2">
+            <a:schemeClr val="accent1"/>
+          </a:lnRef>
+          <a:fillRef idx="0">
+            <a:schemeClr val="accent1"/>
+          </a:fillRef>
+          <a:effectRef idx="1">
+            <a:schemeClr val="accent1"/>
+          </a:effectRef>
+          <a:fontRef idx="minor">
+            <a:schemeClr val="tx1"/>
+          </a:fontRef>
+        </p:style>
+      </p:cxnSp>
+      <p:cxnSp>
+        <p:nvCxnSpPr>
+          <p:cNvPr id="41" name="Straight Arrow Connector 40">
+            <a:extLst>
+              <a:ext uri="{FF2B5EF4-FFF2-40B4-BE49-F238E27FC236}">
+                <a16:creationId xmlns:a16="http://schemas.microsoft.com/office/drawing/2014/main" id="{2A34359F-8F8A-A303-66AA-DE05A0EF4C4A}"/>
+              </a:ext>
+            </a:extLst>
+          </p:cNvPr>
+          <p:cNvCxnSpPr>
+            <a:cxnSpLocks/>
+          </p:cNvCxnSpPr>
+          <p:nvPr/>
+        </p:nvCxnSpPr>
+        <p:spPr>
+          <a:xfrm>
+            <a:off x="8040469" y="3449209"/>
+            <a:ext cx="0" cy="391476"/>
+          </a:xfrm>
+          <a:prstGeom prst="straightConnector1">
+            <a:avLst/>
+          </a:prstGeom>
+          <a:ln>
+            <a:tailEnd type="triangle"/>
+          </a:ln>
+        </p:spPr>
+        <p:style>
+          <a:lnRef idx="2">
+            <a:schemeClr val="accent1"/>
+          </a:lnRef>
+          <a:fillRef idx="0">
+            <a:schemeClr val="accent1"/>
+          </a:fillRef>
+          <a:effectRef idx="1">
+            <a:schemeClr val="accent1"/>
+          </a:effectRef>
+          <a:fontRef idx="minor">
+            <a:schemeClr val="tx1"/>
+          </a:fontRef>
+        </p:style>
+      </p:cxnSp>
+      <p:cxnSp>
+        <p:nvCxnSpPr>
+          <p:cNvPr id="42" name="Straight Arrow Connector 41">
+            <a:extLst>
+              <a:ext uri="{FF2B5EF4-FFF2-40B4-BE49-F238E27FC236}">
+                <a16:creationId xmlns:a16="http://schemas.microsoft.com/office/drawing/2014/main" id="{5C6E8CB4-1680-A74F-AC6F-766B54C7C820}"/>
+              </a:ext>
+            </a:extLst>
+          </p:cNvPr>
+          <p:cNvCxnSpPr>
+            <a:cxnSpLocks/>
+          </p:cNvCxnSpPr>
+          <p:nvPr/>
+        </p:nvCxnSpPr>
+        <p:spPr>
+          <a:xfrm>
+            <a:off x="8039405" y="4427878"/>
+            <a:ext cx="0" cy="391476"/>
+          </a:xfrm>
+          <a:prstGeom prst="straightConnector1">
+            <a:avLst/>
+          </a:prstGeom>
+          <a:ln>
+            <a:tailEnd type="triangle"/>
+          </a:ln>
+        </p:spPr>
+        <p:style>
+          <a:lnRef idx="2">
+            <a:schemeClr val="accent1"/>
+          </a:lnRef>
+          <a:fillRef idx="0">
+            <a:schemeClr val="accent1"/>
+          </a:fillRef>
+          <a:effectRef idx="1">
+            <a:schemeClr val="accent1"/>
+          </a:effectRef>
+          <a:fontRef idx="minor">
+            <a:schemeClr val="tx1"/>
+          </a:fontRef>
+        </p:style>
+      </p:cxnSp>
+      <p:cxnSp>
+        <p:nvCxnSpPr>
+          <p:cNvPr id="43" name="Straight Arrow Connector 42">
+            <a:extLst>
+              <a:ext uri="{FF2B5EF4-FFF2-40B4-BE49-F238E27FC236}">
+                <a16:creationId xmlns:a16="http://schemas.microsoft.com/office/drawing/2014/main" id="{F3D5F5A3-3273-7CF0-4F92-6D7D92EE5DD0}"/>
+              </a:ext>
+            </a:extLst>
+          </p:cNvPr>
+          <p:cNvCxnSpPr>
+            <a:cxnSpLocks/>
+          </p:cNvCxnSpPr>
+          <p:nvPr/>
+        </p:nvCxnSpPr>
+        <p:spPr>
+          <a:xfrm flipV="1">
+            <a:off x="8925541" y="5079245"/>
+            <a:ext cx="750328" cy="1"/>
+          </a:xfrm>
+          <a:prstGeom prst="straightConnector1">
+            <a:avLst/>
+          </a:prstGeom>
+          <a:ln>
+            <a:tailEnd type="triangle"/>
+          </a:ln>
+        </p:spPr>
+        <p:style>
+          <a:lnRef idx="2">
+            <a:schemeClr val="accent1"/>
+          </a:lnRef>
+          <a:fillRef idx="0">
+            <a:schemeClr val="accent1"/>
+          </a:fillRef>
+          <a:effectRef idx="1">
+            <a:schemeClr val="accent1"/>
+          </a:effectRef>
+          <a:fontRef idx="minor">
+            <a:schemeClr val="tx1"/>
+          </a:fontRef>
+        </p:style>
+      </p:cxnSp>
+      <p:cxnSp>
+        <p:nvCxnSpPr>
+          <p:cNvPr id="47" name="Straight Arrow Connector 46">
+            <a:extLst>
+              <a:ext uri="{FF2B5EF4-FFF2-40B4-BE49-F238E27FC236}">
+                <a16:creationId xmlns:a16="http://schemas.microsoft.com/office/drawing/2014/main" id="{91CDB9CD-DFDF-1202-EEFA-F6E177DDF15B}"/>
+              </a:ext>
+            </a:extLst>
+          </p:cNvPr>
+          <p:cNvCxnSpPr>
+            <a:cxnSpLocks/>
+          </p:cNvCxnSpPr>
+          <p:nvPr/>
+        </p:nvCxnSpPr>
+        <p:spPr>
+          <a:xfrm flipV="1">
+            <a:off x="9769642" y="1239923"/>
+            <a:ext cx="0" cy="3849403"/>
+          </a:xfrm>
+          <a:prstGeom prst="straightConnector1">
+            <a:avLst/>
+          </a:prstGeom>
+          <a:ln>
+            <a:tailEnd type="triangle"/>
+          </a:ln>
+        </p:spPr>
+        <p:style>
+          <a:lnRef idx="2">
+            <a:schemeClr val="accent1"/>
+          </a:lnRef>
+          <a:fillRef idx="0">
+            <a:schemeClr val="accent1"/>
+          </a:fillRef>
+          <a:effectRef idx="1">
+            <a:schemeClr val="accent1"/>
+          </a:effectRef>
+          <a:fontRef idx="minor">
+            <a:schemeClr val="tx1"/>
+          </a:fontRef>
+        </p:style>
+      </p:cxnSp>
+      <p:cxnSp>
+        <p:nvCxnSpPr>
+          <p:cNvPr id="50" name="Straight Arrow Connector 49">
+            <a:extLst>
+              <a:ext uri="{FF2B5EF4-FFF2-40B4-BE49-F238E27FC236}">
+                <a16:creationId xmlns:a16="http://schemas.microsoft.com/office/drawing/2014/main" id="{F17DE4C7-E2B6-E6D8-63A0-EBA20CC53E56}"/>
+              </a:ext>
+            </a:extLst>
+          </p:cNvPr>
+          <p:cNvCxnSpPr>
+            <a:cxnSpLocks/>
+            <a:endCxn id="3" idx="3"/>
+          </p:cNvCxnSpPr>
+          <p:nvPr/>
+        </p:nvCxnSpPr>
+        <p:spPr>
+          <a:xfrm flipH="1">
+            <a:off x="8904124" y="1239923"/>
+            <a:ext cx="865518" cy="1"/>
+          </a:xfrm>
+          <a:prstGeom prst="straightConnector1">
+            <a:avLst/>
+          </a:prstGeom>
+          <a:ln>
+            <a:tailEnd type="triangle"/>
+          </a:ln>
+        </p:spPr>
+        <p:style>
+          <a:lnRef idx="2">
+            <a:schemeClr val="accent1"/>
+          </a:lnRef>
+          <a:fillRef idx="0">
+            <a:schemeClr val="accent1"/>
+          </a:fillRef>
+          <a:effectRef idx="1">
+            <a:schemeClr val="accent1"/>
+          </a:effectRef>
+          <a:fontRef idx="minor">
+            <a:schemeClr val="tx1"/>
+          </a:fontRef>
+        </p:style>
+      </p:cxnSp>
+      <p:sp>
+        <p:nvSpPr>
+          <p:cNvPr id="53" name="TextBox 52">
+            <a:extLst>
+              <a:ext uri="{FF2B5EF4-FFF2-40B4-BE49-F238E27FC236}">
+                <a16:creationId xmlns:a16="http://schemas.microsoft.com/office/drawing/2014/main" id="{2177D6AD-CDF1-72D9-1FD7-9B7B554C261D}"/>
+              </a:ext>
+            </a:extLst>
+          </p:cNvPr>
+          <p:cNvSpPr txBox="1"/>
+          <p:nvPr/>
+        </p:nvSpPr>
+        <p:spPr>
+          <a:xfrm>
+            <a:off x="9467320" y="5179162"/>
+            <a:ext cx="750327" cy="369332"/>
+          </a:xfrm>
+          <a:prstGeom prst="rect">
+            <a:avLst/>
+          </a:prstGeom>
+          <a:noFill/>
+        </p:spPr>
+        <p:txBody>
+          <a:bodyPr wrap="square" rtlCol="0">
+            <a:spAutoFit/>
+          </a:bodyPr>
+          <a:lstStyle/>
+          <a:p>
+            <a:r>
+              <a:rPr lang="en-US" dirty="0"/>
+              <a:t>Yes</a:t>
+            </a:r>
+          </a:p>
+        </p:txBody>
+      </p:sp>
+      <p:cxnSp>
+        <p:nvCxnSpPr>
+          <p:cNvPr id="54" name="Straight Arrow Connector 53">
+            <a:extLst>
+              <a:ext uri="{FF2B5EF4-FFF2-40B4-BE49-F238E27FC236}">
+                <a16:creationId xmlns:a16="http://schemas.microsoft.com/office/drawing/2014/main" id="{D8E86742-CBF9-3BD7-7781-AF7589574006}"/>
+              </a:ext>
+            </a:extLst>
+          </p:cNvPr>
+          <p:cNvCxnSpPr>
+            <a:cxnSpLocks/>
+          </p:cNvCxnSpPr>
+          <p:nvPr/>
+        </p:nvCxnSpPr>
+        <p:spPr>
+          <a:xfrm>
+            <a:off x="8039405" y="5350056"/>
+            <a:ext cx="0" cy="391476"/>
+          </a:xfrm>
+          <a:prstGeom prst="straightConnector1">
+            <a:avLst/>
+          </a:prstGeom>
+          <a:ln>
+            <a:tailEnd type="triangle"/>
+          </a:ln>
+        </p:spPr>
+        <p:style>
+          <a:lnRef idx="2">
+            <a:schemeClr val="accent1"/>
+          </a:lnRef>
+          <a:fillRef idx="0">
+            <a:schemeClr val="accent1"/>
+          </a:fillRef>
+          <a:effectRef idx="1">
+            <a:schemeClr val="accent1"/>
+          </a:effectRef>
+          <a:fontRef idx="minor">
+            <a:schemeClr val="tx1"/>
+          </a:fontRef>
+        </p:style>
+      </p:cxnSp>
+      <p:sp>
+        <p:nvSpPr>
+          <p:cNvPr id="55" name="Rectangle: Rounded Corners 54">
+            <a:extLst>
+              <a:ext uri="{FF2B5EF4-FFF2-40B4-BE49-F238E27FC236}">
+                <a16:creationId xmlns:a16="http://schemas.microsoft.com/office/drawing/2014/main" id="{2133561F-7608-0C5A-5ED8-A2C7B921FE3D}"/>
+              </a:ext>
+            </a:extLst>
+          </p:cNvPr>
+          <p:cNvSpPr/>
+          <p:nvPr/>
+        </p:nvSpPr>
+        <p:spPr>
+          <a:xfrm>
+            <a:off x="7059294" y="5758720"/>
+            <a:ext cx="1959818" cy="569167"/>
+          </a:xfrm>
+          <a:prstGeom prst="roundRect">
+            <a:avLst/>
+          </a:prstGeom>
+        </p:spPr>
+        <p:style>
+          <a:lnRef idx="2">
+            <a:schemeClr val="accent1">
+              <a:shade val="15000"/>
+            </a:schemeClr>
+          </a:lnRef>
+          <a:fillRef idx="1">
+            <a:schemeClr val="accent1"/>
+          </a:fillRef>
+          <a:effectRef idx="0">
+            <a:schemeClr val="accent1"/>
+          </a:effectRef>
+          <a:fontRef idx="minor">
+            <a:schemeClr val="lt1"/>
+          </a:fontRef>
+        </p:style>
+        <p:txBody>
+          <a:bodyPr rtlCol="0" anchor="ctr"/>
+          <a:lstStyle/>
+          <a:p>
+            <a:pPr algn="ctr"/>
+            <a:r>
+              <a:rPr lang="en-US" dirty="0"/>
+              <a:t>Complete</a:t>
+            </a:r>
+          </a:p>
+        </p:txBody>
+      </p:sp>
+      <p:sp>
+        <p:nvSpPr>
+          <p:cNvPr id="56" name="TextBox 55">
+            <a:extLst>
+              <a:ext uri="{FF2B5EF4-FFF2-40B4-BE49-F238E27FC236}">
+                <a16:creationId xmlns:a16="http://schemas.microsoft.com/office/drawing/2014/main" id="{FDF6D6B3-08F2-FBDA-4CAD-E5C3E8F9761F}"/>
+              </a:ext>
+            </a:extLst>
+          </p:cNvPr>
+          <p:cNvSpPr txBox="1"/>
+          <p:nvPr/>
+        </p:nvSpPr>
+        <p:spPr>
+          <a:xfrm>
+            <a:off x="8201134" y="5379336"/>
+            <a:ext cx="750327" cy="369332"/>
+          </a:xfrm>
+          <a:prstGeom prst="rect">
+            <a:avLst/>
+          </a:prstGeom>
+          <a:noFill/>
+        </p:spPr>
+        <p:txBody>
+          <a:bodyPr wrap="square" rtlCol="0">
+            <a:spAutoFit/>
+          </a:bodyPr>
+          <a:lstStyle/>
+          <a:p>
+            <a:r>
+              <a:rPr lang="en-US" dirty="0"/>
+              <a:t>No</a:t>
+            </a:r>
+          </a:p>
+        </p:txBody>
+      </p:sp>
+    </p:spTree>
+    <p:extLst>
+      <p:ext uri="{BB962C8B-B14F-4D97-AF65-F5344CB8AC3E}">
+        <p14:creationId xmlns:p14="http://schemas.microsoft.com/office/powerpoint/2010/main" val="2615820756"/>
       </p:ext>
     </p:extLst>
   </p:cSld>

</xml_diff>